<commit_message>
fix(presentation): improve Thank You and Q&A slide readability - Remove 'Ready to Transform Your Workflow' and '30-Day Journey' messaging - Simplify Thank You slide to focus on Questions & Discussion - Change both Q&A and Thank You slides to white background with dark text - Use proper color contrast for better readability - Make Thank You title blue (primary color) for visual appeal - Update PowerPoint version with cleaner thank you message - Emphasize team communication improvement focus
</commit_message>
<xml_diff>
--- a/GitHub_Workflow_Communication_First.pptx
+++ b/GitHub_Workflow_Communication_First.pptx
@@ -3508,32 +3508,22 @@
           <a:lstStyle/>
           <a:p>
             <a:pPr>
-              <a:defRPr sz="1800"/>
-            </a:pPr>
-            <a:r>
-              <a:t>Ready to Improve Team Communication?</a:t>
+              <a:defRPr sz="2000"/>
+            </a:pPr>
+            <a:r>
+              <a:t>Questions &amp; Discussion</a:t>
             </a:r>
           </a:p>
           <a:p/>
           <a:p>
             <a:r>
-              <a:t>💬 Start Phase 1 This Week</a:t>
-            </a:r>
-          </a:p>
-          <a:p>
-            <a:r>
-              <a:t>📈 Measure the Impact</a:t>
-            </a:r>
-          </a:p>
-          <a:p>
-            <a:r>
-              <a:t>🚀 Prepare for Phase 2</a:t>
+              <a:t>Let's improve our team communication together.</a:t>
             </a:r>
           </a:p>
           <a:p/>
           <a:p>
             <a:r>
-              <a:t>Let's build better software, together.</a:t>
+              <a:t>Thank you for your attention!</a:t>
             </a:r>
           </a:p>
         </p:txBody>

</xml_diff>